<commit_message>
Quick Entry Window at search Field
</commit_message>
<xml_diff>
--- a/Doc/JPIERE-0098_�}�g���N�X�E�B���h�E.pptx
+++ b/Doc/JPIERE-0098_�}�g���N�X�E�B���h�E.pptx
@@ -5407,8 +5407,8 @@
         </p:nvSpPr>
         <p:spPr>
           <a:xfrm>
-            <a:off x="5362698" y="980728"/>
-            <a:ext cx="3530478" cy="5688632"/>
+            <a:off x="5362698" y="1268760"/>
+            <a:ext cx="3530478" cy="5256584"/>
           </a:xfrm>
           <a:prstGeom prst="rect">
             <a:avLst/>
@@ -5997,23 +5997,7 @@
                   <a:schemeClr val="tx1"/>
                 </a:solidFill>
               </a:rPr>
-              <a:t>クイック</a:t>
-            </a:r>
-            <a:r>
-              <a:rPr lang="ja-JP" altLang="en-US" sz="1000" u="sng" dirty="0" smtClean="0">
-                <a:solidFill>
-                  <a:schemeClr val="tx1"/>
-                </a:solidFill>
-              </a:rPr>
-              <a:t>入力情報引継</a:t>
-            </a:r>
-            <a:r>
-              <a:rPr lang="ja-JP" altLang="en-US" sz="1000" u="sng" dirty="0" smtClean="0">
-                <a:solidFill>
-                  <a:schemeClr val="tx1"/>
-                </a:solidFill>
-              </a:rPr>
-              <a:t>設定</a:t>
+              <a:t>クイック入力情報引継設定</a:t>
             </a:r>
             <a:r>
               <a:rPr lang="en-US" altLang="ja-JP" sz="1000" dirty="0" smtClean="0">
@@ -6029,15 +6013,7 @@
                   <a:schemeClr val="tx1"/>
                 </a:solidFill>
               </a:rPr>
-              <a:t>連続してクリック入力ウィンドウでデータを登録する際に、直前で入力した値を引き継いで入力するかどうか設定する事ができます。</a:t>
-            </a:r>
-            <a:r>
-              <a:rPr lang="en-US" altLang="ja-JP" sz="1000" dirty="0" smtClean="0">
-                <a:solidFill>
-                  <a:schemeClr val="tx1"/>
-                </a:solidFill>
-              </a:rPr>
-              <a:t>{01:</a:t>
+              <a:t>連続してクリック入力ウィンドウでデータを登録する際に、直前で入力した値を引き継いで入力するかどうか設定する事ができます</a:t>
             </a:r>
             <a:r>
               <a:rPr lang="ja-JP" altLang="en-US" sz="1000" dirty="0" smtClean="0">
@@ -6045,151 +6021,7 @@
                   <a:schemeClr val="tx1"/>
                 </a:solidFill>
               </a:rPr>
-              <a:t>列の情報を</a:t>
-            </a:r>
-            <a:r>
-              <a:rPr lang="ja-JP" altLang="en-US" sz="1000" dirty="0" smtClean="0">
-                <a:solidFill>
-                  <a:schemeClr val="tx1"/>
-                </a:solidFill>
-              </a:rPr>
-              <a:t>引き継ぐ</a:t>
-            </a:r>
-            <a:r>
-              <a:rPr lang="en-US" altLang="ja-JP" sz="1000" dirty="0" smtClean="0">
-                <a:solidFill>
-                  <a:schemeClr val="tx1"/>
-                </a:solidFill>
-              </a:rPr>
-              <a:t>(Column</a:t>
-            </a:r>
-            <a:r>
-              <a:rPr lang="ja-JP" altLang="en-US" sz="1000" dirty="0">
-                <a:solidFill>
-                  <a:schemeClr val="tx1"/>
-                </a:solidFill>
-              </a:rPr>
-              <a:t> </a:t>
-            </a:r>
-            <a:r>
-              <a:rPr lang="en-US" altLang="ja-JP" sz="1000" dirty="0" smtClean="0">
-                <a:solidFill>
-                  <a:schemeClr val="tx1"/>
-                </a:solidFill>
-              </a:rPr>
-              <a:t>info only</a:t>
-            </a:r>
-            <a:r>
-              <a:rPr lang="en-US" altLang="ja-JP" sz="1000" dirty="0" smtClean="0">
-                <a:solidFill>
-                  <a:schemeClr val="tx1"/>
-                </a:solidFill>
-              </a:rPr>
-              <a:t>);</a:t>
-            </a:r>
-            <a:r>
-              <a:rPr lang="en-US" altLang="ja-JP" sz="1000" dirty="0" smtClean="0">
-                <a:solidFill>
-                  <a:schemeClr val="tx1"/>
-                </a:solidFill>
-              </a:rPr>
-              <a:t>02:</a:t>
-            </a:r>
-            <a:r>
-              <a:rPr lang="ja-JP" altLang="en-US" sz="1000" dirty="0" smtClean="0">
-                <a:solidFill>
-                  <a:schemeClr val="tx1"/>
-                </a:solidFill>
-              </a:rPr>
-              <a:t>行</a:t>
-            </a:r>
-            <a:r>
-              <a:rPr lang="ja-JP" altLang="en-US" sz="1000" dirty="0">
-                <a:solidFill>
-                  <a:schemeClr val="tx1"/>
-                </a:solidFill>
-              </a:rPr>
-              <a:t>の</a:t>
-            </a:r>
-            <a:r>
-              <a:rPr lang="ja-JP" altLang="en-US" sz="1000" dirty="0" smtClean="0">
-                <a:solidFill>
-                  <a:schemeClr val="tx1"/>
-                </a:solidFill>
-              </a:rPr>
-              <a:t>情報</a:t>
-            </a:r>
-            <a:r>
-              <a:rPr lang="ja-JP" altLang="en-US" sz="1000" dirty="0" smtClean="0">
-                <a:solidFill>
-                  <a:schemeClr val="tx1"/>
-                </a:solidFill>
-              </a:rPr>
-              <a:t>を</a:t>
-            </a:r>
-            <a:r>
-              <a:rPr lang="ja-JP" altLang="en-US" sz="1000" dirty="0" smtClean="0">
-                <a:solidFill>
-                  <a:schemeClr val="tx1"/>
-                </a:solidFill>
-              </a:rPr>
-              <a:t>引き継ぐ</a:t>
-            </a:r>
-            <a:r>
-              <a:rPr lang="en-US" altLang="ja-JP" sz="1000" dirty="0" smtClean="0">
-                <a:solidFill>
-                  <a:schemeClr val="tx1"/>
-                </a:solidFill>
-              </a:rPr>
-              <a:t>(Row info Only);</a:t>
-            </a:r>
-            <a:r>
-              <a:rPr lang="en-US" altLang="ja-JP" sz="1000" dirty="0" smtClean="0">
-                <a:solidFill>
-                  <a:schemeClr val="tx1"/>
-                </a:solidFill>
-              </a:rPr>
-              <a:t>03:</a:t>
-            </a:r>
-            <a:r>
-              <a:rPr lang="ja-JP" altLang="en-US" sz="1000" dirty="0" smtClean="0">
-                <a:solidFill>
-                  <a:schemeClr val="tx1"/>
-                </a:solidFill>
-              </a:rPr>
-              <a:t>列と</a:t>
-            </a:r>
-            <a:r>
-              <a:rPr lang="ja-JP" altLang="en-US" sz="1000" dirty="0" smtClean="0">
-                <a:solidFill>
-                  <a:schemeClr val="tx1"/>
-                </a:solidFill>
-              </a:rPr>
-              <a:t>行の情報</a:t>
-            </a:r>
-            <a:r>
-              <a:rPr lang="ja-JP" altLang="en-US" sz="1000" dirty="0" smtClean="0">
-                <a:solidFill>
-                  <a:schemeClr val="tx1"/>
-                </a:solidFill>
-              </a:rPr>
-              <a:t>を</a:t>
-            </a:r>
-            <a:r>
-              <a:rPr lang="ja-JP" altLang="en-US" sz="1000" dirty="0" smtClean="0">
-                <a:solidFill>
-                  <a:schemeClr val="tx1"/>
-                </a:solidFill>
-              </a:rPr>
-              <a:t>引き継ぐ</a:t>
-            </a:r>
-            <a:r>
-              <a:rPr lang="en-US" altLang="ja-JP" sz="1000" dirty="0" smtClean="0">
-                <a:solidFill>
-                  <a:schemeClr val="tx1"/>
-                </a:solidFill>
-              </a:rPr>
-              <a:t>(Column and Row info);}</a:t>
+              <a:t>。</a:t>
             </a:r>
             <a:endParaRPr lang="en-US" altLang="ja-JP" sz="1000" dirty="0" smtClean="0">
               <a:solidFill>
@@ -6913,27 +6745,7 @@
                 <a:latin typeface="HGPｺﾞｼｯｸM" pitchFamily="50" charset="-128"/>
                 <a:ea typeface="HGPｺﾞｼｯｸM" pitchFamily="50" charset="-128"/>
               </a:rPr>
-              <a:t>クイック</a:t>
-            </a:r>
-            <a:r>
-              <a:rPr lang="ja-JP" altLang="en-US" sz="800" dirty="0" smtClean="0">
-                <a:solidFill>
-                  <a:schemeClr val="tx1"/>
-                </a:solidFill>
-                <a:latin typeface="HGPｺﾞｼｯｸM" pitchFamily="50" charset="-128"/>
-                <a:ea typeface="HGPｺﾞｼｯｸM" pitchFamily="50" charset="-128"/>
-              </a:rPr>
-              <a:t>入力情報引継</a:t>
-            </a:r>
-            <a:r>
-              <a:rPr lang="ja-JP" altLang="en-US" sz="800" dirty="0" smtClean="0">
-                <a:solidFill>
-                  <a:schemeClr val="tx1"/>
-                </a:solidFill>
-                <a:latin typeface="HGPｺﾞｼｯｸM" pitchFamily="50" charset="-128"/>
-                <a:ea typeface="HGPｺﾞｼｯｸM" pitchFamily="50" charset="-128"/>
-              </a:rPr>
-              <a:t>設定</a:t>
+              <a:t>クイック入力情報引継設定</a:t>
             </a:r>
             <a:endParaRPr lang="ja-JP" altLang="en-US" sz="800" dirty="0">
               <a:solidFill>
@@ -7001,6 +6813,372 @@
                 <a:cs typeface="Meiryo UI" pitchFamily="50" charset="-128"/>
               </a:rPr>
               <a:t>▼</a:t>
+            </a:r>
+          </a:p>
+        </p:txBody>
+      </p:sp>
+      <p:sp>
+        <p:nvSpPr>
+          <p:cNvPr id="84" name="コンテンツ プレースホルダー 2"/>
+          <p:cNvSpPr txBox="1">
+            <a:spLocks/>
+          </p:cNvSpPr>
+          <p:nvPr/>
+        </p:nvSpPr>
+        <p:spPr>
+          <a:xfrm>
+            <a:off x="251520" y="5733288"/>
+            <a:ext cx="5111178" cy="792056"/>
+          </a:xfrm>
+          <a:prstGeom prst="rect">
+            <a:avLst/>
+          </a:prstGeom>
+          <a:noFill/>
+          <a:ln>
+            <a:noFill/>
+          </a:ln>
+        </p:spPr>
+        <p:style>
+          <a:lnRef idx="2">
+            <a:schemeClr val="accent1">
+              <a:shade val="50000"/>
+            </a:schemeClr>
+          </a:lnRef>
+          <a:fillRef idx="1">
+            <a:schemeClr val="accent1"/>
+          </a:fillRef>
+          <a:effectRef idx="0">
+            <a:schemeClr val="accent1"/>
+          </a:effectRef>
+          <a:fontRef idx="minor">
+            <a:schemeClr val="lt1"/>
+          </a:fontRef>
+        </p:style>
+        <p:txBody>
+          <a:bodyPr rtlCol="0" anchor="t"/>
+          <a:lstStyle>
+            <a:defPPr>
+              <a:defRPr lang="ja-JP"/>
+            </a:defPPr>
+            <a:lvl1pPr marL="0" indent="0" algn="just" eaLnBrk="1" hangingPunct="1">
+              <a:lnSpc>
+                <a:spcPct val="120000"/>
+              </a:lnSpc>
+              <a:spcBef>
+                <a:spcPts val="1200"/>
+              </a:spcBef>
+              <a:buNone/>
+              <a:defRPr sz="1800" kern="0">
+                <a:latin typeface="メイリオ" panose="020B0604030504040204" pitchFamily="50" charset="-128"/>
+                <a:ea typeface="メイリオ" panose="020B0604030504040204" pitchFamily="50" charset="-128"/>
+                <a:cs typeface="メイリオ" panose="020B0604030504040204" pitchFamily="50" charset="-128"/>
+              </a:defRPr>
+            </a:lvl1pPr>
+            <a:lvl2pPr>
+              <a:defRPr>
+                <a:solidFill>
+                  <a:schemeClr val="lt1"/>
+                </a:solidFill>
+                <a:latin typeface="+mn-lt"/>
+                <a:ea typeface="+mn-ea"/>
+              </a:defRPr>
+            </a:lvl2pPr>
+            <a:lvl3pPr>
+              <a:defRPr>
+                <a:solidFill>
+                  <a:schemeClr val="lt1"/>
+                </a:solidFill>
+                <a:latin typeface="+mn-lt"/>
+                <a:ea typeface="+mn-ea"/>
+              </a:defRPr>
+            </a:lvl3pPr>
+            <a:lvl4pPr>
+              <a:defRPr>
+                <a:solidFill>
+                  <a:schemeClr val="lt1"/>
+                </a:solidFill>
+                <a:latin typeface="+mn-lt"/>
+                <a:ea typeface="+mn-ea"/>
+              </a:defRPr>
+            </a:lvl4pPr>
+            <a:lvl5pPr>
+              <a:defRPr>
+                <a:solidFill>
+                  <a:schemeClr val="lt1"/>
+                </a:solidFill>
+                <a:latin typeface="+mn-lt"/>
+                <a:ea typeface="+mn-ea"/>
+              </a:defRPr>
+            </a:lvl5pPr>
+            <a:lvl6pPr>
+              <a:defRPr>
+                <a:solidFill>
+                  <a:schemeClr val="lt1"/>
+                </a:solidFill>
+                <a:latin typeface="+mn-lt"/>
+                <a:ea typeface="+mn-ea"/>
+              </a:defRPr>
+            </a:lvl6pPr>
+            <a:lvl7pPr>
+              <a:defRPr>
+                <a:solidFill>
+                  <a:schemeClr val="lt1"/>
+                </a:solidFill>
+                <a:latin typeface="+mn-lt"/>
+                <a:ea typeface="+mn-ea"/>
+              </a:defRPr>
+            </a:lvl7pPr>
+            <a:lvl8pPr>
+              <a:defRPr>
+                <a:solidFill>
+                  <a:schemeClr val="lt1"/>
+                </a:solidFill>
+                <a:latin typeface="+mn-lt"/>
+                <a:ea typeface="+mn-ea"/>
+              </a:defRPr>
+            </a:lvl8pPr>
+            <a:lvl9pPr>
+              <a:defRPr>
+                <a:solidFill>
+                  <a:schemeClr val="lt1"/>
+                </a:solidFill>
+                <a:latin typeface="+mn-lt"/>
+                <a:ea typeface="+mn-ea"/>
+              </a:defRPr>
+            </a:lvl9pPr>
+          </a:lstStyle>
+          <a:p>
+            <a:pPr>
+              <a:spcBef>
+                <a:spcPts val="0"/>
+              </a:spcBef>
+            </a:pPr>
+            <a:r>
+              <a:rPr lang="en-US" altLang="ja-JP" sz="900" dirty="0" smtClean="0">
+                <a:solidFill>
+                  <a:schemeClr val="tx1"/>
+                </a:solidFill>
+              </a:rPr>
+              <a:t>※</a:t>
+            </a:r>
+            <a:r>
+              <a:rPr lang="ja-JP" altLang="en-US" sz="900" dirty="0" smtClean="0">
+                <a:solidFill>
+                  <a:schemeClr val="tx1"/>
+                </a:solidFill>
+              </a:rPr>
+              <a:t>クイック入力情報引継設定の選択リスト</a:t>
+            </a:r>
+            <a:r>
+              <a:rPr lang="en-US" altLang="ja-JP" sz="900" dirty="0">
+                <a:solidFill>
+                  <a:schemeClr val="tx1"/>
+                </a:solidFill>
+              </a:rPr>
+              <a:t>(JP </a:t>
+            </a:r>
+            <a:r>
+              <a:rPr lang="en-US" altLang="ja-JP" sz="900" dirty="0" err="1" smtClean="0">
+                <a:solidFill>
+                  <a:schemeClr val="tx1"/>
+                </a:solidFill>
+              </a:rPr>
+              <a:t>QuickEntryConf</a:t>
+            </a:r>
+            <a:r>
+              <a:rPr lang="en-US" altLang="ja-JP" sz="900" dirty="0" smtClean="0">
+                <a:solidFill>
+                  <a:schemeClr val="tx1"/>
+                </a:solidFill>
+              </a:rPr>
+              <a:t>:</a:t>
+            </a:r>
+            <a:r>
+              <a:rPr lang="ja-JP" altLang="en-US" sz="900" dirty="0" smtClean="0">
+                <a:solidFill>
+                  <a:schemeClr val="tx1"/>
+                </a:solidFill>
+              </a:rPr>
+              <a:t>クイック入力情報引継リスト</a:t>
+            </a:r>
+            <a:r>
+              <a:rPr lang="en-US" altLang="ja-JP" sz="900" dirty="0" smtClean="0">
+                <a:solidFill>
+                  <a:schemeClr val="tx1"/>
+                </a:solidFill>
+              </a:rPr>
+              <a:t>)</a:t>
+            </a:r>
+          </a:p>
+          <a:p>
+            <a:pPr marL="171450" indent="-171450">
+              <a:spcBef>
+                <a:spcPts val="0"/>
+              </a:spcBef>
+              <a:buFont typeface="Arial" panose="020B0604020202020204" pitchFamily="34" charset="0"/>
+              <a:buChar char="•"/>
+            </a:pPr>
+            <a:r>
+              <a:rPr lang="en-US" altLang="ja-JP" sz="900" dirty="0" smtClean="0">
+                <a:solidFill>
+                  <a:schemeClr val="tx1"/>
+                </a:solidFill>
+              </a:rPr>
+              <a:t>01</a:t>
+            </a:r>
+            <a:r>
+              <a:rPr lang="en-US" altLang="ja-JP" sz="900" dirty="0" smtClean="0">
+                <a:solidFill>
+                  <a:schemeClr val="tx1"/>
+                </a:solidFill>
+              </a:rPr>
+              <a:t>:</a:t>
+            </a:r>
+            <a:r>
+              <a:rPr lang="ja-JP" altLang="en-US" sz="900" dirty="0" smtClean="0">
+                <a:solidFill>
+                  <a:schemeClr val="tx1"/>
+                </a:solidFill>
+              </a:rPr>
+              <a:t>列の情報を引き継ぐ</a:t>
+            </a:r>
+            <a:r>
+              <a:rPr lang="en-US" altLang="ja-JP" sz="900" dirty="0" smtClean="0">
+                <a:solidFill>
+                  <a:schemeClr val="tx1"/>
+                </a:solidFill>
+              </a:rPr>
+              <a:t>(Column</a:t>
+            </a:r>
+            <a:r>
+              <a:rPr lang="ja-JP" altLang="en-US" sz="900" dirty="0">
+                <a:solidFill>
+                  <a:schemeClr val="tx1"/>
+                </a:solidFill>
+              </a:rPr>
+              <a:t> </a:t>
+            </a:r>
+            <a:r>
+              <a:rPr lang="en-US" altLang="ja-JP" sz="900" dirty="0" smtClean="0">
+                <a:solidFill>
+                  <a:schemeClr val="tx1"/>
+                </a:solidFill>
+              </a:rPr>
+              <a:t>info only</a:t>
+            </a:r>
+            <a:r>
+              <a:rPr lang="en-US" altLang="ja-JP" sz="900" dirty="0" smtClean="0">
+                <a:solidFill>
+                  <a:schemeClr val="tx1"/>
+                </a:solidFill>
+              </a:rPr>
+              <a:t>);</a:t>
+            </a:r>
+          </a:p>
+          <a:p>
+            <a:pPr marL="171450" indent="-171450">
+              <a:spcBef>
+                <a:spcPts val="0"/>
+              </a:spcBef>
+              <a:buFont typeface="Arial" panose="020B0604020202020204" pitchFamily="34" charset="0"/>
+              <a:buChar char="•"/>
+            </a:pPr>
+            <a:r>
+              <a:rPr lang="en-US" altLang="ja-JP" sz="900" dirty="0" smtClean="0">
+                <a:solidFill>
+                  <a:schemeClr val="tx1"/>
+                </a:solidFill>
+              </a:rPr>
+              <a:t>02</a:t>
+            </a:r>
+            <a:r>
+              <a:rPr lang="en-US" altLang="ja-JP" sz="900" dirty="0" smtClean="0">
+                <a:solidFill>
+                  <a:schemeClr val="tx1"/>
+                </a:solidFill>
+              </a:rPr>
+              <a:t>:</a:t>
+            </a:r>
+            <a:r>
+              <a:rPr lang="ja-JP" altLang="en-US" sz="900" dirty="0" smtClean="0">
+                <a:solidFill>
+                  <a:schemeClr val="tx1"/>
+                </a:solidFill>
+              </a:rPr>
+              <a:t>行</a:t>
+            </a:r>
+            <a:r>
+              <a:rPr lang="ja-JP" altLang="en-US" sz="900" dirty="0">
+                <a:solidFill>
+                  <a:schemeClr val="tx1"/>
+                </a:solidFill>
+              </a:rPr>
+              <a:t>の</a:t>
+            </a:r>
+            <a:r>
+              <a:rPr lang="ja-JP" altLang="en-US" sz="900" dirty="0" smtClean="0">
+                <a:solidFill>
+                  <a:schemeClr val="tx1"/>
+                </a:solidFill>
+              </a:rPr>
+              <a:t>情報を引き継ぐ</a:t>
+            </a:r>
+            <a:r>
+              <a:rPr lang="en-US" altLang="ja-JP" sz="900" dirty="0" smtClean="0">
+                <a:solidFill>
+                  <a:schemeClr val="tx1"/>
+                </a:solidFill>
+              </a:rPr>
+              <a:t>(Row info Only</a:t>
+            </a:r>
+            <a:r>
+              <a:rPr lang="en-US" altLang="ja-JP" sz="900" dirty="0" smtClean="0">
+                <a:solidFill>
+                  <a:schemeClr val="tx1"/>
+                </a:solidFill>
+              </a:rPr>
+              <a:t>);</a:t>
+            </a:r>
+          </a:p>
+          <a:p>
+            <a:pPr marL="171450" indent="-171450">
+              <a:spcBef>
+                <a:spcPts val="0"/>
+              </a:spcBef>
+              <a:buFont typeface="Arial" panose="020B0604020202020204" pitchFamily="34" charset="0"/>
+              <a:buChar char="•"/>
+            </a:pPr>
+            <a:r>
+              <a:rPr lang="en-US" altLang="ja-JP" sz="900" dirty="0" smtClean="0">
+                <a:solidFill>
+                  <a:schemeClr val="tx1"/>
+                </a:solidFill>
+              </a:rPr>
+              <a:t>03</a:t>
+            </a:r>
+            <a:r>
+              <a:rPr lang="en-US" altLang="ja-JP" sz="900" dirty="0" smtClean="0">
+                <a:solidFill>
+                  <a:schemeClr val="tx1"/>
+                </a:solidFill>
+              </a:rPr>
+              <a:t>:</a:t>
+            </a:r>
+            <a:r>
+              <a:rPr lang="ja-JP" altLang="en-US" sz="900" dirty="0" smtClean="0">
+                <a:solidFill>
+                  <a:schemeClr val="tx1"/>
+                </a:solidFill>
+              </a:rPr>
+              <a:t>列と行の情報を引き継ぐ</a:t>
+            </a:r>
+            <a:r>
+              <a:rPr lang="en-US" altLang="ja-JP" sz="900" dirty="0" smtClean="0">
+                <a:solidFill>
+                  <a:schemeClr val="tx1"/>
+                </a:solidFill>
+              </a:rPr>
+              <a:t>(Column and Row info);}</a:t>
             </a:r>
           </a:p>
         </p:txBody>
@@ -20445,27 +20623,7 @@
                 <a:latin typeface="HGPｺﾞｼｯｸM" pitchFamily="50" charset="-128"/>
                 <a:ea typeface="HGPｺﾞｼｯｸM" pitchFamily="50" charset="-128"/>
               </a:rPr>
-              <a:t>クイック</a:t>
-            </a:r>
-            <a:r>
-              <a:rPr lang="ja-JP" altLang="en-US" sz="800" dirty="0" smtClean="0">
-                <a:solidFill>
-                  <a:schemeClr val="tx1"/>
-                </a:solidFill>
-                <a:latin typeface="HGPｺﾞｼｯｸM" pitchFamily="50" charset="-128"/>
-                <a:ea typeface="HGPｺﾞｼｯｸM" pitchFamily="50" charset="-128"/>
-              </a:rPr>
-              <a:t>入力情報引継</a:t>
-            </a:r>
-            <a:r>
-              <a:rPr lang="ja-JP" altLang="en-US" sz="800" dirty="0" smtClean="0">
-                <a:solidFill>
-                  <a:schemeClr val="tx1"/>
-                </a:solidFill>
-                <a:latin typeface="HGPｺﾞｼｯｸM" pitchFamily="50" charset="-128"/>
-                <a:ea typeface="HGPｺﾞｼｯｸM" pitchFamily="50" charset="-128"/>
-              </a:rPr>
-              <a:t>設定</a:t>
+              <a:t>クイック入力情報引継設定</a:t>
             </a:r>
             <a:endParaRPr lang="ja-JP" altLang="en-US" sz="800" dirty="0">
               <a:solidFill>

</xml_diff>

<commit_message>
Matrix Window Model Update
</commit_message>
<xml_diff>
--- a/Doc/JPIERE-0098_�}�g���N�X�E�B���h�E.pptx
+++ b/Doc/JPIERE-0098_�}�g���N�X�E�B���h�E.pptx
@@ -2012,7 +2012,7 @@
           <a:p>
             <a:fld id="{D2B9E0EA-6101-4826-8EB2-593C6C3A4928}" type="datetimeFigureOut">
               <a:rPr kumimoji="1" lang="ja-JP" altLang="en-US" smtClean="0"/>
-              <a:t>2015/7/28</a:t>
+              <a:t>2015/7/29</a:t>
             </a:fld>
             <a:endParaRPr kumimoji="1" lang="ja-JP" altLang="en-US"/>
           </a:p>
@@ -5997,15 +5997,7 @@
                   <a:schemeClr val="tx1"/>
                 </a:solidFill>
               </a:rPr>
-              <a:t>クイック</a:t>
-            </a:r>
-            <a:r>
-              <a:rPr lang="ja-JP" altLang="en-US" sz="1000" u="sng" dirty="0" smtClean="0">
-                <a:solidFill>
-                  <a:schemeClr val="tx1"/>
-                </a:solidFill>
-              </a:rPr>
-              <a:t>入力引継情報設定</a:t>
+              <a:t>クイック入力引継情報設定</a:t>
             </a:r>
             <a:r>
               <a:rPr lang="en-US" altLang="ja-JP" sz="1000" dirty="0" smtClean="0">
@@ -6021,15 +6013,7 @@
                   <a:schemeClr val="tx1"/>
                 </a:solidFill>
               </a:rPr>
-              <a:t>連続してクリック入力ウィンドウでデータを登録する際に、直前で入力した値を引き継いで入力するかどうか設定する事ができます</a:t>
-            </a:r>
-            <a:r>
-              <a:rPr lang="ja-JP" altLang="en-US" sz="1000" dirty="0" smtClean="0">
-                <a:solidFill>
-                  <a:schemeClr val="tx1"/>
-                </a:solidFill>
-              </a:rPr>
-              <a:t>。</a:t>
+              <a:t>連続してクリック入力ウィンドウでデータを登録する際に、直前で入力した値を引き継いで入力するかどうか設定する事ができます。</a:t>
             </a:r>
             <a:endParaRPr lang="en-US" altLang="ja-JP" sz="1000" dirty="0" smtClean="0">
               <a:solidFill>
@@ -6753,17 +6737,7 @@
                 <a:latin typeface="HGPｺﾞｼｯｸM" pitchFamily="50" charset="-128"/>
                 <a:ea typeface="HGPｺﾞｼｯｸM" pitchFamily="50" charset="-128"/>
               </a:rPr>
-              <a:t>クイック</a:t>
-            </a:r>
-            <a:r>
-              <a:rPr lang="ja-JP" altLang="en-US" sz="800" dirty="0" smtClean="0">
-                <a:solidFill>
-                  <a:schemeClr val="tx1"/>
-                </a:solidFill>
-                <a:latin typeface="HGPｺﾞｼｯｸM" pitchFamily="50" charset="-128"/>
-                <a:ea typeface="HGPｺﾞｼｯｸM" pitchFamily="50" charset="-128"/>
-              </a:rPr>
-              <a:t>入力引継設情報定</a:t>
+              <a:t>クイック入力引継設情報定</a:t>
             </a:r>
             <a:endParaRPr lang="ja-JP" altLang="en-US" sz="800" dirty="0">
               <a:solidFill>
@@ -7042,7 +7016,15 @@
                   <a:schemeClr val="tx1"/>
                 </a:solidFill>
               </a:rPr>
-              <a:t>01</a:t>
+              <a:t>01:</a:t>
+            </a:r>
+            <a:r>
+              <a:rPr lang="ja-JP" altLang="en-US" sz="900" dirty="0" smtClean="0">
+                <a:solidFill>
+                  <a:schemeClr val="tx1"/>
+                </a:solidFill>
+              </a:rPr>
+              <a:t>列の情報を引き継ぐ</a:t>
             </a:r>
             <a:r>
               <a:rPr lang="en-US" altLang="ja-JP" sz="900" dirty="0" smtClean="0">
@@ -7050,15 +7032,15 @@
                   <a:schemeClr val="tx1"/>
                 </a:solidFill>
               </a:rPr>
-              <a:t>:</a:t>
-            </a:r>
-            <a:r>
-              <a:rPr lang="ja-JP" altLang="en-US" sz="900" dirty="0" smtClean="0">
-                <a:solidFill>
-                  <a:schemeClr val="tx1"/>
-                </a:solidFill>
-              </a:rPr>
-              <a:t>列の情報を引き継ぐ</a:t>
+              <a:t>(Column</a:t>
+            </a:r>
+            <a:r>
+              <a:rPr lang="ja-JP" altLang="en-US" sz="900" dirty="0">
+                <a:solidFill>
+                  <a:schemeClr val="tx1"/>
+                </a:solidFill>
+              </a:rPr>
+              <a:t> </a:t>
             </a:r>
             <a:r>
               <a:rPr lang="en-US" altLang="ja-JP" sz="900" dirty="0" smtClean="0">
@@ -7066,31 +7048,7 @@
                   <a:schemeClr val="tx1"/>
                 </a:solidFill>
               </a:rPr>
-              <a:t>(Column</a:t>
-            </a:r>
-            <a:r>
-              <a:rPr lang="ja-JP" altLang="en-US" sz="900" dirty="0">
-                <a:solidFill>
-                  <a:schemeClr val="tx1"/>
-                </a:solidFill>
-              </a:rPr>
-              <a:t> </a:t>
-            </a:r>
-            <a:r>
-              <a:rPr lang="en-US" altLang="ja-JP" sz="900" dirty="0" smtClean="0">
-                <a:solidFill>
-                  <a:schemeClr val="tx1"/>
-                </a:solidFill>
-              </a:rPr>
-              <a:t>info only</a:t>
-            </a:r>
-            <a:r>
-              <a:rPr lang="en-US" altLang="ja-JP" sz="900" dirty="0" smtClean="0">
-                <a:solidFill>
-                  <a:schemeClr val="tx1"/>
-                </a:solidFill>
-              </a:rPr>
-              <a:t>)</a:t>
+              <a:t>info only)</a:t>
             </a:r>
           </a:p>
           <a:p>
@@ -7107,7 +7065,31 @@
                   <a:schemeClr val="tx1"/>
                 </a:solidFill>
               </a:rPr>
-              <a:t>02</a:t>
+              <a:t>02:</a:t>
+            </a:r>
+            <a:r>
+              <a:rPr lang="ja-JP" altLang="en-US" sz="900" dirty="0" smtClean="0">
+                <a:solidFill>
+                  <a:schemeClr val="tx1"/>
+                </a:solidFill>
+              </a:rPr>
+              <a:t>行</a:t>
+            </a:r>
+            <a:r>
+              <a:rPr lang="ja-JP" altLang="en-US" sz="900" dirty="0">
+                <a:solidFill>
+                  <a:schemeClr val="tx1"/>
+                </a:solidFill>
+              </a:rPr>
+              <a:t>の</a:t>
+            </a:r>
+            <a:r>
+              <a:rPr lang="ja-JP" altLang="en-US" sz="900" dirty="0" smtClean="0">
+                <a:solidFill>
+                  <a:schemeClr val="tx1"/>
+                </a:solidFill>
+              </a:rPr>
+              <a:t>情報を引き継ぐ</a:t>
             </a:r>
             <a:r>
               <a:rPr lang="en-US" altLang="ja-JP" sz="900" dirty="0" smtClean="0">
@@ -7115,47 +7097,7 @@
                   <a:schemeClr val="tx1"/>
                 </a:solidFill>
               </a:rPr>
-              <a:t>:</a:t>
-            </a:r>
-            <a:r>
-              <a:rPr lang="ja-JP" altLang="en-US" sz="900" dirty="0" smtClean="0">
-                <a:solidFill>
-                  <a:schemeClr val="tx1"/>
-                </a:solidFill>
-              </a:rPr>
-              <a:t>行</a:t>
-            </a:r>
-            <a:r>
-              <a:rPr lang="ja-JP" altLang="en-US" sz="900" dirty="0">
-                <a:solidFill>
-                  <a:schemeClr val="tx1"/>
-                </a:solidFill>
-              </a:rPr>
-              <a:t>の</a:t>
-            </a:r>
-            <a:r>
-              <a:rPr lang="ja-JP" altLang="en-US" sz="900" dirty="0" smtClean="0">
-                <a:solidFill>
-                  <a:schemeClr val="tx1"/>
-                </a:solidFill>
-              </a:rPr>
-              <a:t>情報を引き継ぐ</a:t>
-            </a:r>
-            <a:r>
-              <a:rPr lang="en-US" altLang="ja-JP" sz="900" dirty="0" smtClean="0">
-                <a:solidFill>
-                  <a:schemeClr val="tx1"/>
-                </a:solidFill>
-              </a:rPr>
-              <a:t>(Row info Only</a:t>
-            </a:r>
-            <a:r>
-              <a:rPr lang="en-US" altLang="ja-JP" sz="900" dirty="0" smtClean="0">
-                <a:solidFill>
-                  <a:schemeClr val="tx1"/>
-                </a:solidFill>
-              </a:rPr>
-              <a:t>)</a:t>
+              <a:t>(Row info Only)</a:t>
             </a:r>
           </a:p>
           <a:p>
@@ -7172,7 +7114,15 @@
                   <a:schemeClr val="tx1"/>
                 </a:solidFill>
               </a:rPr>
-              <a:t>03</a:t>
+              <a:t>03:</a:t>
+            </a:r>
+            <a:r>
+              <a:rPr lang="ja-JP" altLang="en-US" sz="900" dirty="0" smtClean="0">
+                <a:solidFill>
+                  <a:schemeClr val="tx1"/>
+                </a:solidFill>
+              </a:rPr>
+              <a:t>列と行の情報を引き継ぐ</a:t>
             </a:r>
             <a:r>
               <a:rPr lang="en-US" altLang="ja-JP" sz="900" dirty="0" smtClean="0">
@@ -7180,37 +7130,8 @@
                   <a:schemeClr val="tx1"/>
                 </a:solidFill>
               </a:rPr>
-              <a:t>:</a:t>
-            </a:r>
-            <a:r>
-              <a:rPr lang="ja-JP" altLang="en-US" sz="900" dirty="0" smtClean="0">
-                <a:solidFill>
-                  <a:schemeClr val="tx1"/>
-                </a:solidFill>
-              </a:rPr>
-              <a:t>列と行の情報を引き継ぐ</a:t>
-            </a:r>
-            <a:r>
-              <a:rPr lang="en-US" altLang="ja-JP" sz="900" dirty="0" smtClean="0">
-                <a:solidFill>
-                  <a:schemeClr val="tx1"/>
-                </a:solidFill>
-              </a:rPr>
-              <a:t>(Column and Row info</a:t>
-            </a:r>
-            <a:r>
-              <a:rPr lang="en-US" altLang="ja-JP" sz="900" dirty="0" smtClean="0">
-                <a:solidFill>
-                  <a:schemeClr val="tx1"/>
-                </a:solidFill>
-              </a:rPr>
-              <a:t>)</a:t>
-            </a:r>
-            <a:endParaRPr lang="en-US" altLang="ja-JP" sz="900" dirty="0" smtClean="0">
-              <a:solidFill>
-                <a:schemeClr val="tx1"/>
-              </a:solidFill>
-            </a:endParaRPr>
+              <a:t>(Column and Row info)</a:t>
+            </a:r>
           </a:p>
         </p:txBody>
       </p:sp>
@@ -10108,7 +10029,7 @@
         </p:nvSpPr>
         <p:spPr>
           <a:xfrm>
-            <a:off x="251520" y="1412256"/>
+            <a:off x="251520" y="1916312"/>
             <a:ext cx="5112568" cy="720600"/>
           </a:xfrm>
           <a:prstGeom prst="rect">
@@ -10159,7 +10080,7 @@
         </p:nvGrpSpPr>
         <p:grpSpPr>
           <a:xfrm>
-            <a:off x="286777" y="1514321"/>
+            <a:off x="286777" y="2018377"/>
             <a:ext cx="5037932" cy="185935"/>
             <a:chOff x="518802" y="2089641"/>
             <a:chExt cx="8257578" cy="304762"/>
@@ -10969,7 +10890,7 @@
         </p:blipFill>
         <p:spPr>
           <a:xfrm>
-            <a:off x="2915816" y="1810718"/>
+            <a:off x="2915816" y="2314774"/>
             <a:ext cx="279365" cy="279365"/>
           </a:xfrm>
           <a:prstGeom prst="rect">
@@ -10999,7 +10920,7 @@
         </p:blipFill>
         <p:spPr>
           <a:xfrm>
-            <a:off x="5021341" y="1810718"/>
+            <a:off x="5021341" y="2314774"/>
             <a:ext cx="279365" cy="279365"/>
           </a:xfrm>
           <a:prstGeom prst="rect">
@@ -11029,7 +10950,7 @@
         </p:blipFill>
         <p:spPr>
           <a:xfrm>
-            <a:off x="3131840" y="1810718"/>
+            <a:off x="3131840" y="2314774"/>
             <a:ext cx="279365" cy="279365"/>
           </a:xfrm>
           <a:prstGeom prst="rect">
@@ -11059,7 +10980,7 @@
         </p:blipFill>
         <p:spPr>
           <a:xfrm>
-            <a:off x="4796650" y="1810718"/>
+            <a:off x="4796650" y="2314774"/>
             <a:ext cx="279365" cy="279365"/>
           </a:xfrm>
           <a:prstGeom prst="rect">
@@ -11075,7 +10996,7 @@
         </p:nvSpPr>
         <p:spPr bwMode="auto">
           <a:xfrm>
-            <a:off x="3341171" y="1832250"/>
+            <a:off x="3341171" y="2336306"/>
             <a:ext cx="1469566" cy="236300"/>
           </a:xfrm>
           <a:prstGeom prst="rect">
@@ -11130,7 +11051,7 @@
         </p:nvSpPr>
         <p:spPr>
           <a:xfrm>
-            <a:off x="251520" y="2132833"/>
+            <a:off x="251520" y="2636889"/>
             <a:ext cx="5112568" cy="1800223"/>
           </a:xfrm>
           <a:prstGeom prst="rect">
@@ -11181,7 +11102,7 @@
         </p:nvSpPr>
         <p:spPr>
           <a:xfrm>
-            <a:off x="1331800" y="2204864"/>
+            <a:off x="1331800" y="2708920"/>
             <a:ext cx="1440000" cy="216000"/>
           </a:xfrm>
           <a:prstGeom prst="rect">
@@ -11251,7 +11172,7 @@
         </p:nvSpPr>
         <p:spPr>
           <a:xfrm>
-            <a:off x="254087" y="1124744"/>
+            <a:off x="254087" y="1628800"/>
             <a:ext cx="1440000" cy="288000"/>
           </a:xfrm>
           <a:prstGeom prst="snipRoundRect">
@@ -11318,7 +11239,7 @@
         </p:nvSpPr>
         <p:spPr>
           <a:xfrm>
-            <a:off x="243459" y="2204864"/>
+            <a:off x="243459" y="2708920"/>
             <a:ext cx="1080000" cy="216000"/>
           </a:xfrm>
           <a:prstGeom prst="rect">
@@ -11378,7 +11299,7 @@
         </p:nvSpPr>
         <p:spPr>
           <a:xfrm>
-            <a:off x="3851928" y="2204840"/>
+            <a:off x="3851928" y="2708896"/>
             <a:ext cx="1440000" cy="216000"/>
           </a:xfrm>
           <a:prstGeom prst="rect">
@@ -11448,7 +11369,7 @@
         </p:nvSpPr>
         <p:spPr>
           <a:xfrm>
-            <a:off x="2763892" y="2204840"/>
+            <a:off x="2763892" y="2708896"/>
             <a:ext cx="1080000" cy="216000"/>
           </a:xfrm>
           <a:prstGeom prst="rect">
@@ -11508,7 +11429,7 @@
         </p:nvSpPr>
         <p:spPr>
           <a:xfrm>
-            <a:off x="1331648" y="2492896"/>
+            <a:off x="1331648" y="2996952"/>
             <a:ext cx="1440000" cy="216000"/>
           </a:xfrm>
           <a:prstGeom prst="rect">
@@ -11578,7 +11499,7 @@
         </p:nvSpPr>
         <p:spPr>
           <a:xfrm>
-            <a:off x="243307" y="2492896"/>
+            <a:off x="243307" y="2996952"/>
             <a:ext cx="1080000" cy="216000"/>
           </a:xfrm>
           <a:prstGeom prst="rect">
@@ -11648,7 +11569,7 @@
         </p:nvSpPr>
         <p:spPr>
           <a:xfrm>
-            <a:off x="1339827" y="3364507"/>
+            <a:off x="1339827" y="3868563"/>
             <a:ext cx="3960000" cy="216000"/>
           </a:xfrm>
           <a:prstGeom prst="rect">
@@ -11705,7 +11626,7 @@
         </p:nvSpPr>
         <p:spPr>
           <a:xfrm>
-            <a:off x="251488" y="3364508"/>
+            <a:off x="251488" y="3868564"/>
             <a:ext cx="1080000" cy="216000"/>
           </a:xfrm>
           <a:prstGeom prst="rect">
@@ -11758,7 +11679,7 @@
         </p:nvSpPr>
         <p:spPr>
           <a:xfrm>
-            <a:off x="1547784" y="3652532"/>
+            <a:off x="1547784" y="4156588"/>
             <a:ext cx="1080000" cy="144000"/>
           </a:xfrm>
           <a:prstGeom prst="rect">
@@ -11818,7 +11739,7 @@
         </p:nvSpPr>
         <p:spPr>
           <a:xfrm>
-            <a:off x="1403768" y="3652516"/>
+            <a:off x="1403768" y="4156572"/>
             <a:ext cx="144000" cy="144000"/>
           </a:xfrm>
           <a:prstGeom prst="rect">
@@ -11881,7 +11802,7 @@
         </p:nvSpPr>
         <p:spPr bwMode="auto">
           <a:xfrm>
-            <a:off x="251520" y="1834066"/>
+            <a:off x="251520" y="2338122"/>
             <a:ext cx="2122050" cy="226782"/>
           </a:xfrm>
           <a:prstGeom prst="rect">
@@ -11932,7 +11853,7 @@
         </p:nvSpPr>
         <p:spPr>
           <a:xfrm>
-            <a:off x="1331800" y="3076499"/>
+            <a:off x="1331800" y="3580555"/>
             <a:ext cx="1440000" cy="216000"/>
           </a:xfrm>
           <a:prstGeom prst="rect">
@@ -12000,7 +11921,7 @@
         </p:nvSpPr>
         <p:spPr>
           <a:xfrm>
-            <a:off x="251488" y="3076476"/>
+            <a:off x="251488" y="3580532"/>
             <a:ext cx="1080152" cy="208484"/>
           </a:xfrm>
           <a:prstGeom prst="rect">
@@ -12053,7 +11974,7 @@
         </p:nvSpPr>
         <p:spPr>
           <a:xfrm>
-            <a:off x="2555506" y="3076499"/>
+            <a:off x="2555506" y="3580555"/>
             <a:ext cx="216000" cy="216000"/>
           </a:xfrm>
           <a:prstGeom prst="rect">
@@ -12113,7 +12034,7 @@
         </p:nvSpPr>
         <p:spPr>
           <a:xfrm>
-            <a:off x="1331648" y="2773413"/>
+            <a:off x="1331648" y="3277469"/>
             <a:ext cx="1440000" cy="216000"/>
           </a:xfrm>
           <a:prstGeom prst="rect">
@@ -12181,7 +12102,7 @@
         </p:nvSpPr>
         <p:spPr>
           <a:xfrm>
-            <a:off x="395288" y="2773412"/>
+            <a:off x="395288" y="3277468"/>
             <a:ext cx="936200" cy="231031"/>
           </a:xfrm>
           <a:prstGeom prst="rect">
@@ -12265,7 +12186,7 @@
         </p:blipFill>
         <p:spPr>
           <a:xfrm>
-            <a:off x="2560136" y="2773413"/>
+            <a:off x="2560136" y="3277469"/>
             <a:ext cx="223539" cy="223539"/>
           </a:xfrm>
           <a:prstGeom prst="rect">
@@ -12283,8 +12204,8 @@
         </p:nvSpPr>
         <p:spPr>
           <a:xfrm>
-            <a:off x="5362002" y="1434261"/>
-            <a:ext cx="3530478" cy="2642811"/>
+            <a:off x="5362002" y="1938317"/>
+            <a:ext cx="3530478" cy="2498795"/>
           </a:xfrm>
           <a:prstGeom prst="rect">
             <a:avLst/>
@@ -12516,7 +12437,127 @@
                   <a:schemeClr val="tx1"/>
                 </a:solidFill>
               </a:rPr>
-              <a:t>検索条件の入力を必須にするかどうか設定します。</a:t>
+              <a:t>検索条件の入力を必須にするかどうか設定します</a:t>
+            </a:r>
+            <a:r>
+              <a:rPr lang="ja-JP" altLang="en-US" sz="1050" dirty="0" smtClean="0">
+                <a:solidFill>
+                  <a:schemeClr val="tx1"/>
+                </a:solidFill>
+              </a:rPr>
+              <a:t>。</a:t>
+            </a:r>
+            <a:r>
+              <a:rPr lang="en-US" altLang="ja-JP" sz="1050" dirty="0" smtClean="0">
+                <a:solidFill>
+                  <a:schemeClr val="tx1"/>
+                </a:solidFill>
+              </a:rPr>
+              <a:t>※</a:t>
+            </a:r>
+            <a:r>
+              <a:rPr lang="ja-JP" altLang="en-US" sz="1050" dirty="0" smtClean="0">
+                <a:solidFill>
+                  <a:schemeClr val="tx1"/>
+                </a:solidFill>
+              </a:rPr>
+              <a:t>必須フィールドを</a:t>
+            </a:r>
+            <a:r>
+              <a:rPr lang="en-US" altLang="ja-JP" sz="1050" dirty="0" smtClean="0">
+                <a:solidFill>
+                  <a:schemeClr val="tx1"/>
+                </a:solidFill>
+              </a:rPr>
+              <a:t>ON</a:t>
+            </a:r>
+            <a:r>
+              <a:rPr lang="ja-JP" altLang="en-US" sz="1050" dirty="0" smtClean="0">
+                <a:solidFill>
+                  <a:schemeClr val="tx1"/>
+                </a:solidFill>
+              </a:rPr>
+              <a:t>にする場合、そのカラムは、縦軸</a:t>
+            </a:r>
+            <a:r>
+              <a:rPr lang="en-US" altLang="ja-JP" sz="1050" dirty="0" smtClean="0">
+                <a:solidFill>
+                  <a:schemeClr val="tx1"/>
+                </a:solidFill>
+              </a:rPr>
+              <a:t>(X</a:t>
+            </a:r>
+            <a:r>
+              <a:rPr lang="ja-JP" altLang="en-US" sz="1050" dirty="0" smtClean="0">
+                <a:solidFill>
+                  <a:schemeClr val="tx1"/>
+                </a:solidFill>
+              </a:rPr>
+              <a:t>軸</a:t>
+            </a:r>
+            <a:r>
+              <a:rPr lang="en-US" altLang="ja-JP" sz="1050" dirty="0" smtClean="0">
+                <a:solidFill>
+                  <a:schemeClr val="tx1"/>
+                </a:solidFill>
+              </a:rPr>
+              <a:t>/</a:t>
+            </a:r>
+            <a:r>
+              <a:rPr lang="ja-JP" altLang="en-US" sz="1050" dirty="0" smtClean="0">
+                <a:solidFill>
+                  <a:schemeClr val="tx1"/>
+                </a:solidFill>
+              </a:rPr>
+              <a:t>列</a:t>
+            </a:r>
+            <a:r>
+              <a:rPr lang="en-US" altLang="ja-JP" sz="1050" dirty="0" smtClean="0">
+                <a:solidFill>
+                  <a:schemeClr val="tx1"/>
+                </a:solidFill>
+              </a:rPr>
+              <a:t>)</a:t>
+            </a:r>
+            <a:r>
+              <a:rPr lang="ja-JP" altLang="en-US" sz="1050" dirty="0" smtClean="0">
+                <a:solidFill>
+                  <a:schemeClr val="tx1"/>
+                </a:solidFill>
+              </a:rPr>
+              <a:t>となるカラムと横軸</a:t>
+            </a:r>
+            <a:r>
+              <a:rPr lang="en-US" altLang="ja-JP" sz="1050" dirty="0" smtClean="0">
+                <a:solidFill>
+                  <a:schemeClr val="tx1"/>
+                </a:solidFill>
+              </a:rPr>
+              <a:t>(Y</a:t>
+            </a:r>
+            <a:r>
+              <a:rPr lang="ja-JP" altLang="en-US" sz="1050" dirty="0" smtClean="0">
+                <a:solidFill>
+                  <a:schemeClr val="tx1"/>
+                </a:solidFill>
+              </a:rPr>
+              <a:t>軸／行</a:t>
+            </a:r>
+            <a:r>
+              <a:rPr lang="en-US" altLang="ja-JP" sz="1050" dirty="0" smtClean="0">
+                <a:solidFill>
+                  <a:schemeClr val="tx1"/>
+                </a:solidFill>
+              </a:rPr>
+              <a:t>)</a:t>
+            </a:r>
+            <a:r>
+              <a:rPr lang="ja-JP" altLang="en-US" sz="1050" dirty="0" smtClean="0">
+                <a:solidFill>
+                  <a:schemeClr val="tx1"/>
+                </a:solidFill>
+              </a:rPr>
+              <a:t>となるカラムを含めた複合ユニーク制約が必要になります。</a:t>
             </a:r>
             <a:endParaRPr lang="en-US" altLang="ja-JP" sz="1050" dirty="0" smtClean="0">
               <a:solidFill>
@@ -12534,7 +12575,7 @@
         </p:nvSpPr>
         <p:spPr>
           <a:xfrm>
-            <a:off x="3995936" y="3140984"/>
+            <a:off x="3995936" y="3645040"/>
             <a:ext cx="1080000" cy="144000"/>
           </a:xfrm>
           <a:prstGeom prst="rect">
@@ -12594,7 +12635,7 @@
         </p:nvSpPr>
         <p:spPr>
           <a:xfrm>
-            <a:off x="3851920" y="3140968"/>
+            <a:off x="3851920" y="3645024"/>
             <a:ext cx="144000" cy="144000"/>
           </a:xfrm>
           <a:prstGeom prst="rect">
@@ -12646,6 +12687,169 @@
               </a:rPr>
               <a:t>　</a:t>
             </a:r>
+          </a:p>
+        </p:txBody>
+      </p:sp>
+      <p:sp>
+        <p:nvSpPr>
+          <p:cNvPr id="65" name="コンテンツ プレースホルダー 2"/>
+          <p:cNvSpPr txBox="1">
+            <a:spLocks/>
+          </p:cNvSpPr>
+          <p:nvPr/>
+        </p:nvSpPr>
+        <p:spPr>
+          <a:xfrm>
+            <a:off x="251520" y="908720"/>
+            <a:ext cx="8640000" cy="1080120"/>
+          </a:xfrm>
+          <a:prstGeom prst="rect">
+            <a:avLst/>
+          </a:prstGeom>
+          <a:noFill/>
+          <a:ln>
+            <a:noFill/>
+          </a:ln>
+        </p:spPr>
+        <p:style>
+          <a:lnRef idx="2">
+            <a:schemeClr val="accent1">
+              <a:shade val="50000"/>
+            </a:schemeClr>
+          </a:lnRef>
+          <a:fillRef idx="1">
+            <a:schemeClr val="accent1"/>
+          </a:fillRef>
+          <a:effectRef idx="0">
+            <a:schemeClr val="accent1"/>
+          </a:effectRef>
+          <a:fontRef idx="minor">
+            <a:schemeClr val="lt1"/>
+          </a:fontRef>
+        </p:style>
+        <p:txBody>
+          <a:bodyPr rtlCol="0" anchor="t"/>
+          <a:lstStyle>
+            <a:defPPr>
+              <a:defRPr lang="ja-JP"/>
+            </a:defPPr>
+            <a:lvl1pPr marL="0" indent="0" algn="just" eaLnBrk="1" hangingPunct="1">
+              <a:lnSpc>
+                <a:spcPct val="120000"/>
+              </a:lnSpc>
+              <a:spcBef>
+                <a:spcPts val="1200"/>
+              </a:spcBef>
+              <a:buNone/>
+              <a:defRPr sz="1800" kern="0">
+                <a:latin typeface="メイリオ" panose="020B0604030504040204" pitchFamily="50" charset="-128"/>
+                <a:ea typeface="メイリオ" panose="020B0604030504040204" pitchFamily="50" charset="-128"/>
+                <a:cs typeface="メイリオ" panose="020B0604030504040204" pitchFamily="50" charset="-128"/>
+              </a:defRPr>
+            </a:lvl1pPr>
+            <a:lvl2pPr>
+              <a:defRPr>
+                <a:solidFill>
+                  <a:schemeClr val="lt1"/>
+                </a:solidFill>
+                <a:latin typeface="+mn-lt"/>
+                <a:ea typeface="+mn-ea"/>
+              </a:defRPr>
+            </a:lvl2pPr>
+            <a:lvl3pPr>
+              <a:defRPr>
+                <a:solidFill>
+                  <a:schemeClr val="lt1"/>
+                </a:solidFill>
+                <a:latin typeface="+mn-lt"/>
+                <a:ea typeface="+mn-ea"/>
+              </a:defRPr>
+            </a:lvl3pPr>
+            <a:lvl4pPr>
+              <a:defRPr>
+                <a:solidFill>
+                  <a:schemeClr val="lt1"/>
+                </a:solidFill>
+                <a:latin typeface="+mn-lt"/>
+                <a:ea typeface="+mn-ea"/>
+              </a:defRPr>
+            </a:lvl4pPr>
+            <a:lvl5pPr>
+              <a:defRPr>
+                <a:solidFill>
+                  <a:schemeClr val="lt1"/>
+                </a:solidFill>
+                <a:latin typeface="+mn-lt"/>
+                <a:ea typeface="+mn-ea"/>
+              </a:defRPr>
+            </a:lvl5pPr>
+            <a:lvl6pPr>
+              <a:defRPr>
+                <a:solidFill>
+                  <a:schemeClr val="lt1"/>
+                </a:solidFill>
+                <a:latin typeface="+mn-lt"/>
+                <a:ea typeface="+mn-ea"/>
+              </a:defRPr>
+            </a:lvl6pPr>
+            <a:lvl7pPr>
+              <a:defRPr>
+                <a:solidFill>
+                  <a:schemeClr val="lt1"/>
+                </a:solidFill>
+                <a:latin typeface="+mn-lt"/>
+                <a:ea typeface="+mn-ea"/>
+              </a:defRPr>
+            </a:lvl7pPr>
+            <a:lvl8pPr>
+              <a:defRPr>
+                <a:solidFill>
+                  <a:schemeClr val="lt1"/>
+                </a:solidFill>
+                <a:latin typeface="+mn-lt"/>
+                <a:ea typeface="+mn-ea"/>
+              </a:defRPr>
+            </a:lvl8pPr>
+            <a:lvl9pPr>
+              <a:defRPr>
+                <a:solidFill>
+                  <a:schemeClr val="lt1"/>
+                </a:solidFill>
+                <a:latin typeface="+mn-lt"/>
+                <a:ea typeface="+mn-ea"/>
+              </a:defRPr>
+            </a:lvl9pPr>
+          </a:lstStyle>
+          <a:p>
+            <a:r>
+              <a:rPr lang="ja-JP" altLang="en-US" sz="1400" dirty="0">
+                <a:solidFill>
+                  <a:schemeClr val="tx1"/>
+                </a:solidFill>
+              </a:rPr>
+              <a:t>　</a:t>
+            </a:r>
+            <a:r>
+              <a:rPr lang="ja-JP" altLang="en-US" sz="1400" dirty="0" smtClean="0">
+                <a:solidFill>
+                  <a:schemeClr val="tx1"/>
+                </a:solidFill>
+              </a:rPr>
+              <a:t>列キーフィールド、行キーフィールド、編集フィールドで使用されていないフィールド</a:t>
+            </a:r>
+            <a:r>
+              <a:rPr lang="ja-JP" altLang="en-US" sz="1400" dirty="0" smtClean="0">
+                <a:solidFill>
+                  <a:schemeClr val="tx1"/>
+                </a:solidFill>
+              </a:rPr>
+              <a:t>を検索フィールドとして使用する事ができます。</a:t>
+            </a:r>
+            <a:endParaRPr lang="en-US" altLang="ja-JP" sz="1400" dirty="0" smtClean="0">
+              <a:solidFill>
+                <a:schemeClr val="tx1"/>
+              </a:solidFill>
+            </a:endParaRPr>
           </a:p>
         </p:txBody>
       </p:sp>
@@ -20678,17 +20882,7 @@
                 <a:latin typeface="HGPｺﾞｼｯｸM" pitchFamily="50" charset="-128"/>
                 <a:ea typeface="HGPｺﾞｼｯｸM" pitchFamily="50" charset="-128"/>
               </a:rPr>
-              <a:t>クイック</a:t>
-            </a:r>
-            <a:r>
-              <a:rPr lang="ja-JP" altLang="en-US" sz="800" dirty="0" smtClean="0">
-                <a:solidFill>
-                  <a:schemeClr val="tx1"/>
-                </a:solidFill>
-                <a:latin typeface="HGPｺﾞｼｯｸM" pitchFamily="50" charset="-128"/>
-                <a:ea typeface="HGPｺﾞｼｯｸM" pitchFamily="50" charset="-128"/>
-              </a:rPr>
-              <a:t>入力引継情報設定</a:t>
+              <a:t>クイック入力引継情報設定</a:t>
             </a:r>
             <a:endParaRPr lang="ja-JP" altLang="en-US" sz="800" dirty="0">
               <a:solidFill>
@@ -25324,7 +25518,23 @@
                   <a:schemeClr val="tx1"/>
                 </a:solidFill>
               </a:rPr>
-              <a:t>兄弟タブとなる検索フィールドタブに含まれていないフィールドである事を確認する。</a:t>
+              <a:t>兄弟タブとなる検索フィールドタブに含まれていないフィールドである事を</a:t>
+            </a:r>
+            <a:r>
+              <a:rPr lang="ja-JP" altLang="en-US" sz="1050" smtClean="0">
+                <a:solidFill>
+                  <a:schemeClr val="tx1"/>
+                </a:solidFill>
+              </a:rPr>
+              <a:t>確認</a:t>
+            </a:r>
+            <a:r>
+              <a:rPr lang="ja-JP" altLang="en-US" sz="1050" smtClean="0">
+                <a:solidFill>
+                  <a:schemeClr val="tx1"/>
+                </a:solidFill>
+              </a:rPr>
+              <a:t>する（検索フィールドとして使用されていない事を確認する）。</a:t>
             </a:r>
             <a:endParaRPr lang="en-US" altLang="ja-JP" sz="1050" dirty="0" smtClean="0">
               <a:solidFill>
@@ -29545,133 +29755,17 @@
                   <a:schemeClr val="tx1"/>
                 </a:solidFill>
               </a:rPr>
-              <a:t>フィールドが列キーと行キーになっていない事を確認する。</a:t>
+              <a:t>フィールドが列キーと行キーになっていない事を確認する</a:t>
+            </a:r>
+            <a:r>
+              <a:rPr lang="ja-JP" altLang="en-US" sz="1050" dirty="0" smtClean="0">
+                <a:solidFill>
+                  <a:schemeClr val="tx1"/>
+                </a:solidFill>
+              </a:rPr>
+              <a:t>。</a:t>
             </a:r>
             <a:endParaRPr lang="en-US" altLang="ja-JP" sz="1050" dirty="0" smtClean="0">
-              <a:solidFill>
-                <a:schemeClr val="tx1"/>
-              </a:solidFill>
-            </a:endParaRPr>
-          </a:p>
-          <a:p>
-            <a:pPr marL="171450" indent="-171450">
-              <a:spcBef>
-                <a:spcPts val="600"/>
-              </a:spcBef>
-              <a:buFont typeface="Arial" panose="020B0604020202020204" pitchFamily="34" charset="0"/>
-              <a:buChar char="•"/>
-            </a:pPr>
-            <a:r>
-              <a:rPr lang="ja-JP" altLang="en-US" sz="1050" dirty="0">
-                <a:solidFill>
-                  <a:schemeClr val="tx1"/>
-                </a:solidFill>
-              </a:rPr>
-              <a:t>フィールド</a:t>
-            </a:r>
-            <a:r>
-              <a:rPr lang="ja-JP" altLang="en-US" sz="1050" dirty="0" smtClean="0">
-                <a:solidFill>
-                  <a:schemeClr val="tx1"/>
-                </a:solidFill>
-              </a:rPr>
-              <a:t>に対応するカラムの設定で、</a:t>
-            </a:r>
-            <a:r>
-              <a:rPr lang="en-US" altLang="ja-JP" sz="1050" dirty="0" err="1" smtClean="0">
-                <a:solidFill>
-                  <a:schemeClr val="tx1"/>
-                </a:solidFill>
-              </a:rPr>
-              <a:t>IsParent</a:t>
-            </a:r>
-            <a:r>
-              <a:rPr lang="ja-JP" altLang="en-US" sz="1050" dirty="0" smtClean="0">
-                <a:solidFill>
-                  <a:schemeClr val="tx1"/>
-                </a:solidFill>
-              </a:rPr>
-              <a:t>フラグが</a:t>
-            </a:r>
-            <a:r>
-              <a:rPr lang="en-US" altLang="ja-JP" sz="1050" dirty="0" smtClean="0">
-                <a:solidFill>
-                  <a:schemeClr val="tx1"/>
-                </a:solidFill>
-              </a:rPr>
-              <a:t>ON</a:t>
-            </a:r>
-            <a:r>
-              <a:rPr lang="ja-JP" altLang="en-US" sz="1050" dirty="0" smtClean="0">
-                <a:solidFill>
-                  <a:schemeClr val="tx1"/>
-                </a:solidFill>
-              </a:rPr>
-              <a:t>になっていない事を確認する。</a:t>
-            </a:r>
-            <a:endParaRPr lang="en-US" altLang="ja-JP" sz="1050" dirty="0" smtClean="0">
-              <a:solidFill>
-                <a:schemeClr val="tx1"/>
-              </a:solidFill>
-            </a:endParaRPr>
-          </a:p>
-          <a:p>
-            <a:pPr marL="171450" indent="-171450">
-              <a:spcBef>
-                <a:spcPts val="600"/>
-              </a:spcBef>
-              <a:buFont typeface="Arial" panose="020B0604020202020204" pitchFamily="34" charset="0"/>
-              <a:buChar char="•"/>
-            </a:pPr>
-            <a:r>
-              <a:rPr lang="ja-JP" altLang="en-US" sz="1050" dirty="0">
-                <a:solidFill>
-                  <a:schemeClr val="tx1"/>
-                </a:solidFill>
-              </a:rPr>
-              <a:t>フィールド</a:t>
-            </a:r>
-            <a:r>
-              <a:rPr lang="ja-JP" altLang="en-US" sz="1050" dirty="0" smtClean="0">
-                <a:solidFill>
-                  <a:schemeClr val="tx1"/>
-                </a:solidFill>
-              </a:rPr>
-              <a:t>に対応するカラムの設定で、</a:t>
-            </a:r>
-            <a:r>
-              <a:rPr lang="en-US" altLang="ja-JP" sz="1050" dirty="0" err="1" smtClean="0">
-                <a:solidFill>
-                  <a:schemeClr val="tx1"/>
-                </a:solidFill>
-              </a:rPr>
-              <a:t>IsUpdatable</a:t>
-            </a:r>
-            <a:r>
-              <a:rPr lang="ja-JP" altLang="en-US" sz="1050" dirty="0" smtClean="0">
-                <a:solidFill>
-                  <a:schemeClr val="tx1"/>
-                </a:solidFill>
-              </a:rPr>
-              <a:t>フラグが</a:t>
-            </a:r>
-            <a:r>
-              <a:rPr lang="en-US" altLang="ja-JP" sz="1050" dirty="0" smtClean="0">
-                <a:solidFill>
-                  <a:schemeClr val="tx1"/>
-                </a:solidFill>
-              </a:rPr>
-              <a:t>ON</a:t>
-            </a:r>
-            <a:r>
-              <a:rPr lang="ja-JP" altLang="en-US" sz="1050" dirty="0" smtClean="0">
-                <a:solidFill>
-                  <a:schemeClr val="tx1"/>
-                </a:solidFill>
-              </a:rPr>
-              <a:t>になっている事を確認する。</a:t>
-            </a:r>
-            <a:endParaRPr lang="en-US" altLang="ja-JP" sz="1050" dirty="0">
               <a:solidFill>
                 <a:schemeClr val="tx1"/>
               </a:solidFill>
@@ -30120,7 +30214,7 @@
         </p:nvSpPr>
         <p:spPr>
           <a:xfrm>
-            <a:off x="251520" y="2348880"/>
+            <a:off x="251520" y="2060848"/>
             <a:ext cx="8640000" cy="432000"/>
           </a:xfrm>
           <a:prstGeom prst="rect">
@@ -30238,7 +30332,7 @@
         </p:nvSpPr>
         <p:spPr>
           <a:xfrm>
-            <a:off x="251520" y="2852936"/>
+            <a:off x="251520" y="2564904"/>
             <a:ext cx="8635144" cy="792088"/>
           </a:xfrm>
           <a:prstGeom prst="rect">

</xml_diff>